<commit_message>
Changes for course 20190121
</commit_message>
<xml_diff>
--- a/Slides/Module 3 - Maps.pptx
+++ b/Slides/Module 3 - Maps.pptx
@@ -310,7 +310,7 @@
               <a:pPr>
                 <a:defRPr/>
               </a:pPr>
-              <a:t>16 December 2016</a:t>
+              <a:t>21 January 2019</a:t>
             </a:fld>
             <a:endParaRPr lang="de-DE"/>
           </a:p>
@@ -622,7 +622,7 @@
               <a:pPr>
                 <a:defRPr/>
               </a:pPr>
-              <a:t>16. Dezember 2016</a:t>
+              <a:t>21. Januar 2019</a:t>
             </a:fld>
             <a:r>
               <a:rPr lang="de-DE"/>
@@ -940,7 +940,7 @@
               <a:pPr>
                 <a:defRPr/>
               </a:pPr>
-              <a:t>16. Dezember 2016</a:t>
+              <a:t>21. Januar 2019</a:t>
             </a:fld>
             <a:r>
               <a:rPr lang="de-DE"/>
@@ -1275,7 +1275,7 @@
               <a:pPr>
                 <a:defRPr/>
               </a:pPr>
-              <a:t>16. Dezember 2016</a:t>
+              <a:t>21. Januar 2019</a:t>
             </a:fld>
             <a:r>
               <a:rPr lang="de-DE"/>
@@ -1609,7 +1609,7 @@
               <a:pPr>
                 <a:defRPr/>
               </a:pPr>
-              <a:t>16. Dezember 2016</a:t>
+              <a:t>21. Januar 2019</a:t>
             </a:fld>
             <a:r>
               <a:rPr lang="de-DE"/>
@@ -1871,7 +1871,7 @@
               <a:pPr>
                 <a:defRPr/>
               </a:pPr>
-              <a:t>16. Dezember 2016</a:t>
+              <a:t>21. Januar 2019</a:t>
             </a:fld>
             <a:r>
               <a:rPr lang="de-DE"/>
@@ -1995,7 +1995,7 @@
               <a:pPr>
                 <a:defRPr/>
               </a:pPr>
-              <a:t>16. Dezember 2016</a:t>
+              <a:t>21. Januar 2019</a:t>
             </a:fld>
             <a:r>
               <a:rPr lang="de-DE"/>
@@ -2175,7 +2175,7 @@
           <a:p>
             <a:fld id="{71270186-4901-48B9-8054-819D66B783DF}" type="datetimeFigureOut">
               <a:rPr lang="en-US" smtClean="0"/>
-              <a:t>12/16/2016</a:t>
+              <a:t>1/21/2019</a:t>
             </a:fld>
             <a:endParaRPr lang="en-US"/>
           </a:p>
@@ -2343,7 +2343,7 @@
           <a:p>
             <a:fld id="{71270186-4901-48B9-8054-819D66B783DF}" type="datetimeFigureOut">
               <a:rPr lang="en-US" smtClean="0"/>
-              <a:t>12/16/2016</a:t>
+              <a:t>1/21/2019</a:t>
             </a:fld>
             <a:endParaRPr lang="en-US"/>
           </a:p>
@@ -2521,7 +2521,7 @@
           <a:p>
             <a:fld id="{71270186-4901-48B9-8054-819D66B783DF}" type="datetimeFigureOut">
               <a:rPr lang="en-US" smtClean="0"/>
-              <a:t>12/16/2016</a:t>
+              <a:t>1/21/2019</a:t>
             </a:fld>
             <a:endParaRPr lang="en-US"/>
           </a:p>
@@ -3965,7 +3965,7 @@
           <a:p>
             <a:fld id="{71270186-4901-48B9-8054-819D66B783DF}" type="datetimeFigureOut">
               <a:rPr lang="en-US" smtClean="0"/>
-              <a:t>12/16/2016</a:t>
+              <a:t>1/21/2019</a:t>
             </a:fld>
             <a:endParaRPr lang="en-US"/>
           </a:p>
@@ -5266,7 +5266,7 @@
           <a:p>
             <a:fld id="{71270186-4901-48B9-8054-819D66B783DF}" type="datetimeFigureOut">
               <a:rPr lang="en-US" smtClean="0"/>
-              <a:t>12/16/2016</a:t>
+              <a:t>1/21/2019</a:t>
             </a:fld>
             <a:endParaRPr lang="en-US"/>
           </a:p>
@@ -5495,7 +5495,7 @@
           <a:p>
             <a:fld id="{71270186-4901-48B9-8054-819D66B783DF}" type="datetimeFigureOut">
               <a:rPr lang="en-US" smtClean="0"/>
-              <a:t>12/16/2016</a:t>
+              <a:t>1/21/2019</a:t>
             </a:fld>
             <a:endParaRPr lang="en-US"/>
           </a:p>
@@ -5859,7 +5859,7 @@
           <a:p>
             <a:fld id="{71270186-4901-48B9-8054-819D66B783DF}" type="datetimeFigureOut">
               <a:rPr lang="en-US" smtClean="0"/>
-              <a:t>12/16/2016</a:t>
+              <a:t>1/21/2019</a:t>
             </a:fld>
             <a:endParaRPr lang="en-US"/>
           </a:p>
@@ -5976,7 +5976,7 @@
           <a:p>
             <a:fld id="{71270186-4901-48B9-8054-819D66B783DF}" type="datetimeFigureOut">
               <a:rPr lang="en-US" smtClean="0"/>
-              <a:t>12/16/2016</a:t>
+              <a:t>1/21/2019</a:t>
             </a:fld>
             <a:endParaRPr lang="en-US"/>
           </a:p>
@@ -6071,7 +6071,7 @@
           <a:p>
             <a:fld id="{71270186-4901-48B9-8054-819D66B783DF}" type="datetimeFigureOut">
               <a:rPr lang="en-US" smtClean="0"/>
-              <a:t>12/16/2016</a:t>
+              <a:t>1/21/2019</a:t>
             </a:fld>
             <a:endParaRPr lang="en-US"/>
           </a:p>
@@ -6346,7 +6346,7 @@
           <a:p>
             <a:fld id="{71270186-4901-48B9-8054-819D66B783DF}" type="datetimeFigureOut">
               <a:rPr lang="en-US" smtClean="0"/>
-              <a:t>12/16/2016</a:t>
+              <a:t>1/21/2019</a:t>
             </a:fld>
             <a:endParaRPr lang="en-US"/>
           </a:p>
@@ -6598,7 +6598,7 @@
           <a:p>
             <a:fld id="{71270186-4901-48B9-8054-819D66B783DF}" type="datetimeFigureOut">
               <a:rPr lang="en-US" smtClean="0"/>
-              <a:t>12/16/2016</a:t>
+              <a:t>1/21/2019</a:t>
             </a:fld>
             <a:endParaRPr lang="en-US"/>
           </a:p>
@@ -6809,7 +6809,7 @@
           <a:p>
             <a:fld id="{71270186-4901-48B9-8054-819D66B783DF}" type="datetimeFigureOut">
               <a:rPr lang="en-US" smtClean="0"/>
-              <a:t>12/16/2016</a:t>
+              <a:t>1/21/2019</a:t>
             </a:fld>
             <a:endParaRPr lang="en-US"/>
           </a:p>
@@ -22635,10 +22635,14 @@
           <a:lstStyle/>
           <a:p>
             <a:r>
-              <a:rPr lang="en-US"/>
-              <a:t>Basic and Complex Map Links</a:t>
+              <a:rPr lang="en-US" dirty="0"/>
+              <a:t>Map links are either Direct or use </a:t>
             </a:r>
-            <a:endParaRPr lang="sv-SE"/>
+            <a:r>
+              <a:rPr lang="en-US" dirty="0" err="1"/>
+              <a:t>Functoids</a:t>
+            </a:r>
+            <a:endParaRPr lang="sv-SE" dirty="0"/>
           </a:p>
         </p:txBody>
       </p:sp>
@@ -28482,10 +28486,10 @@
           <a:p>
             <a:pPr algn="ctr" eaLnBrk="1" hangingPunct="1"/>
             <a:r>
-              <a:rPr lang="sv-SE" sz="1800" b="1"/>
-              <a:t>Simple</a:t>
+              <a:rPr lang="sv-SE" sz="1800" b="1" dirty="0" err="1"/>
+              <a:t>Direct</a:t>
             </a:r>
-            <a:endParaRPr lang="sv-SE" b="1"/>
+            <a:endParaRPr lang="sv-SE" b="1" dirty="0"/>
           </a:p>
         </p:txBody>
       </p:sp>
@@ -34475,10 +34479,10 @@
           <a:p>
             <a:pPr algn="ctr" eaLnBrk="1" hangingPunct="1"/>
             <a:r>
-              <a:rPr lang="sv-SE" sz="1800" b="1"/>
-              <a:t>Complex</a:t>
+              <a:rPr lang="sv-SE" sz="1800" b="1" dirty="0" err="1"/>
+              <a:t>Functiods</a:t>
             </a:r>
-            <a:endParaRPr lang="sv-SE" b="1"/>
+            <a:endParaRPr lang="sv-SE" b="1" dirty="0"/>
           </a:p>
         </p:txBody>
       </p:sp>

</xml_diff>